<commit_message>
Update readme & some pic
</commit_message>
<xml_diff>
--- a/doc/structure-graph.pptx
+++ b/doc/structure-graph.pptx
@@ -5,11 +5,12 @@
     <p:sldMasterId id="2147483672" r:id="rId1"/>
   </p:sldMasterIdLst>
   <p:notesMasterIdLst>
-    <p:notesMasterId r:id="rId4"/>
+    <p:notesMasterId r:id="rId5"/>
   </p:notesMasterIdLst>
   <p:sldIdLst>
     <p:sldId id="256" r:id="rId2"/>
     <p:sldId id="258" r:id="rId3"/>
+    <p:sldId id="259" r:id="rId4"/>
   </p:sldIdLst>
   <p:sldSz cx="12192000" cy="6858000"/>
   <p:notesSz cx="6858000" cy="9144000"/>
@@ -3838,13 +3839,6 @@
               </a:ln>
               <a:effectLst/>
               <a:extLst>
-                <a:ext uri="{909E8E84-426E-40DD-AFC4-6F175D3DCCD1}">
-                  <a14:hiddenFill xmlns:a14="http://schemas.microsoft.com/office/drawing/2010/main">
-                    <a:solidFill>
-                      <a:schemeClr val="bg1"/>
-                    </a:solidFill>
-                  </a14:hiddenFill>
-                </a:ext>
                 <a:ext uri="{AF507438-7753-43E0-B8FC-AC1667EBCBE1}">
                   <a14:hiddenEffects xmlns:a14="http://schemas.microsoft.com/office/drawing/2010/main">
                     <a:effectLst>
@@ -4161,13 +4155,6 @@
               </a:ln>
               <a:effectLst/>
               <a:extLst>
-                <a:ext uri="{909E8E84-426E-40DD-AFC4-6F175D3DCCD1}">
-                  <a14:hiddenFill xmlns:a14="http://schemas.microsoft.com/office/drawing/2010/main">
-                    <a:solidFill>
-                      <a:schemeClr val="bg1"/>
-                    </a:solidFill>
-                  </a14:hiddenFill>
-                </a:ext>
                 <a:ext uri="{AF507438-7753-43E0-B8FC-AC1667EBCBE1}">
                   <a14:hiddenEffects xmlns:a14="http://schemas.microsoft.com/office/drawing/2010/main">
                     <a:effectLst>
@@ -4481,13 +4468,6 @@
               </a:ln>
               <a:effectLst/>
               <a:extLst>
-                <a:ext uri="{909E8E84-426E-40DD-AFC4-6F175D3DCCD1}">
-                  <a14:hiddenFill xmlns:a14="http://schemas.microsoft.com/office/drawing/2010/main">
-                    <a:solidFill>
-                      <a:schemeClr val="bg1"/>
-                    </a:solidFill>
-                  </a14:hiddenFill>
-                </a:ext>
                 <a:ext uri="{AF507438-7753-43E0-B8FC-AC1667EBCBE1}">
                   <a14:hiddenEffects xmlns:a14="http://schemas.microsoft.com/office/drawing/2010/main">
                     <a:effectLst>
@@ -4801,13 +4781,6 @@
               </a:ln>
               <a:effectLst/>
               <a:extLst>
-                <a:ext uri="{909E8E84-426E-40DD-AFC4-6F175D3DCCD1}">
-                  <a14:hiddenFill xmlns:a14="http://schemas.microsoft.com/office/drawing/2010/main">
-                    <a:solidFill>
-                      <a:schemeClr val="bg1"/>
-                    </a:solidFill>
-                  </a14:hiddenFill>
-                </a:ext>
                 <a:ext uri="{AF507438-7753-43E0-B8FC-AC1667EBCBE1}">
                   <a14:hiddenEffects xmlns:a14="http://schemas.microsoft.com/office/drawing/2010/main">
                     <a:effectLst>
@@ -6346,10 +6319,6 @@
               </a:rPr>
               <a:t>ALU</a:t>
             </a:r>
-            <a:endParaRPr lang="en-US" altLang="zh-CN" dirty="0">
-              <a:latin typeface="Comic Sans MS" panose="030F0702030302020204" pitchFamily="66" charset="0"/>
-              <a:ea typeface="宋体" panose="02010600030101010101" pitchFamily="2" charset="-122"/>
-            </a:endParaRPr>
           </a:p>
         </p:txBody>
       </p:sp>
@@ -8718,9 +8687,6 @@
               </a:rPr>
               <a:t>Fetch</a:t>
             </a:r>
-            <a:endParaRPr lang="en-US" altLang="zh-CN" b="1" dirty="0">
-              <a:ea typeface="宋体" panose="02010600030101010101" pitchFamily="2" charset="-122"/>
-            </a:endParaRPr>
           </a:p>
         </p:txBody>
       </p:sp>
@@ -10589,6 +10555,310 @@
       </p:par>
     </p:tnLst>
   </p:timing>
+</p:sld>
+</file>
+
+<file path=ppt/slides/slide3.xml><?xml version="1.0" encoding="utf-8"?>
+<p:sld xmlns:a="http://schemas.openxmlformats.org/drawingml/2006/main" xmlns:r="http://schemas.openxmlformats.org/officeDocument/2006/relationships" xmlns:p="http://schemas.openxmlformats.org/presentationml/2006/main">
+  <p:cSld>
+    <p:spTree>
+      <p:nvGrpSpPr>
+        <p:cNvPr id="1" name=""/>
+        <p:cNvGrpSpPr/>
+        <p:nvPr/>
+      </p:nvGrpSpPr>
+      <p:grpSpPr>
+        <a:xfrm>
+          <a:off x="0" y="0"/>
+          <a:ext cx="0" cy="0"/>
+          <a:chOff x="0" y="0"/>
+          <a:chExt cx="0" cy="0"/>
+        </a:xfrm>
+      </p:grpSpPr>
+      <p:pic>
+        <p:nvPicPr>
+          <p:cNvPr id="4" name="图片 3"/>
+          <p:cNvPicPr>
+            <a:picLocks noChangeAspect="1"/>
+          </p:cNvPicPr>
+          <p:nvPr/>
+        </p:nvPicPr>
+        <p:blipFill>
+          <a:blip r:embed="rId2">
+            <a:extLst>
+              <a:ext uri="{28A0092B-C50C-407E-A947-70E740481C1C}">
+                <a14:useLocalDpi xmlns:a14="http://schemas.microsoft.com/office/drawing/2010/main" val="0"/>
+              </a:ext>
+            </a:extLst>
+          </a:blip>
+          <a:stretch>
+            <a:fillRect/>
+          </a:stretch>
+        </p:blipFill>
+        <p:spPr>
+          <a:xfrm>
+            <a:off x="1200520" y="432224"/>
+            <a:ext cx="3781999" cy="5997435"/>
+          </a:xfrm>
+          <a:prstGeom prst="rect">
+            <a:avLst/>
+          </a:prstGeom>
+        </p:spPr>
+      </p:pic>
+      <p:pic>
+        <p:nvPicPr>
+          <p:cNvPr id="5" name="图片 4"/>
+          <p:cNvPicPr>
+            <a:picLocks noChangeAspect="1"/>
+          </p:cNvPicPr>
+          <p:nvPr/>
+        </p:nvPicPr>
+        <p:blipFill>
+          <a:blip r:embed="rId3" cstate="print">
+            <a:extLst>
+              <a:ext uri="{28A0092B-C50C-407E-A947-70E740481C1C}">
+                <a14:useLocalDpi xmlns:a14="http://schemas.microsoft.com/office/drawing/2010/main" val="0"/>
+              </a:ext>
+            </a:extLst>
+          </a:blip>
+          <a:stretch>
+            <a:fillRect/>
+          </a:stretch>
+        </p:blipFill>
+        <p:spPr>
+          <a:xfrm>
+            <a:off x="6222501" y="432224"/>
+            <a:ext cx="4926317" cy="2715422"/>
+          </a:xfrm>
+          <a:prstGeom prst="rect">
+            <a:avLst/>
+          </a:prstGeom>
+        </p:spPr>
+      </p:pic>
+      <p:sp>
+        <p:nvSpPr>
+          <p:cNvPr id="7" name="矩形 6"/>
+          <p:cNvSpPr/>
+          <p:nvPr/>
+        </p:nvSpPr>
+        <p:spPr>
+          <a:xfrm>
+            <a:off x="1833993" y="4231489"/>
+            <a:ext cx="2963007" cy="1627881"/>
+          </a:xfrm>
+          <a:prstGeom prst="rect">
+            <a:avLst/>
+          </a:prstGeom>
+          <a:noFill/>
+          <a:ln w="38100">
+            <a:solidFill>
+              <a:srgbClr val="FF0000"/>
+            </a:solidFill>
+          </a:ln>
+        </p:spPr>
+        <p:style>
+          <a:lnRef idx="2">
+            <a:schemeClr val="accent1">
+              <a:shade val="50000"/>
+            </a:schemeClr>
+          </a:lnRef>
+          <a:fillRef idx="1">
+            <a:schemeClr val="accent1"/>
+          </a:fillRef>
+          <a:effectRef idx="0">
+            <a:schemeClr val="accent1"/>
+          </a:effectRef>
+          <a:fontRef idx="minor">
+            <a:schemeClr val="lt1"/>
+          </a:fontRef>
+        </p:style>
+        <p:txBody>
+          <a:bodyPr rtlCol="0" anchor="ctr"/>
+          <a:lstStyle/>
+          <a:p>
+            <a:pPr algn="ctr"/>
+            <a:endParaRPr lang="zh-CN" altLang="en-US"/>
+          </a:p>
+        </p:txBody>
+      </p:sp>
+      <p:sp>
+        <p:nvSpPr>
+          <p:cNvPr id="6" name="左弧形箭头 5"/>
+          <p:cNvSpPr/>
+          <p:nvPr/>
+        </p:nvSpPr>
+        <p:spPr>
+          <a:xfrm rot="13290256" flipH="1">
+            <a:off x="3753244" y="581936"/>
+            <a:ext cx="1116363" cy="4384936"/>
+          </a:xfrm>
+          <a:prstGeom prst="curvedRightArrow">
+            <a:avLst>
+              <a:gd name="adj1" fmla="val 27397"/>
+              <a:gd name="adj2" fmla="val 50000"/>
+              <a:gd name="adj3" fmla="val 34391"/>
+            </a:avLst>
+          </a:prstGeom>
+        </p:spPr>
+        <p:style>
+          <a:lnRef idx="0">
+            <a:schemeClr val="accent2"/>
+          </a:lnRef>
+          <a:fillRef idx="3">
+            <a:schemeClr val="accent2"/>
+          </a:fillRef>
+          <a:effectRef idx="3">
+            <a:schemeClr val="accent2"/>
+          </a:effectRef>
+          <a:fontRef idx="minor">
+            <a:schemeClr val="lt1"/>
+          </a:fontRef>
+        </p:style>
+        <p:txBody>
+          <a:bodyPr rtlCol="0" anchor="ctr"/>
+          <a:lstStyle/>
+          <a:p>
+            <a:pPr algn="ctr"/>
+            <a:endParaRPr lang="zh-CN" altLang="en-US">
+              <a:solidFill>
+                <a:schemeClr val="tx1"/>
+              </a:solidFill>
+            </a:endParaRPr>
+          </a:p>
+        </p:txBody>
+      </p:sp>
+      <p:pic>
+        <p:nvPicPr>
+          <p:cNvPr id="9" name="图片 8"/>
+          <p:cNvPicPr>
+            <a:picLocks noChangeAspect="1"/>
+          </p:cNvPicPr>
+          <p:nvPr/>
+        </p:nvPicPr>
+        <p:blipFill>
+          <a:blip r:embed="rId4">
+            <a:extLst>
+              <a:ext uri="{28A0092B-C50C-407E-A947-70E740481C1C}">
+                <a14:useLocalDpi xmlns:a14="http://schemas.microsoft.com/office/drawing/2010/main" val="0"/>
+              </a:ext>
+            </a:extLst>
+          </a:blip>
+          <a:stretch>
+            <a:fillRect/>
+          </a:stretch>
+        </p:blipFill>
+        <p:spPr>
+          <a:xfrm>
+            <a:off x="6222501" y="3668172"/>
+            <a:ext cx="4926317" cy="2754514"/>
+          </a:xfrm>
+          <a:prstGeom prst="rect">
+            <a:avLst/>
+          </a:prstGeom>
+        </p:spPr>
+      </p:pic>
+      <p:sp>
+        <p:nvSpPr>
+          <p:cNvPr id="10" name="矩形 9"/>
+          <p:cNvSpPr/>
+          <p:nvPr/>
+        </p:nvSpPr>
+        <p:spPr>
+          <a:xfrm>
+            <a:off x="8546123" y="2106026"/>
+            <a:ext cx="1055077" cy="589939"/>
+          </a:xfrm>
+          <a:prstGeom prst="rect">
+            <a:avLst/>
+          </a:prstGeom>
+          <a:noFill/>
+          <a:ln w="38100">
+            <a:solidFill>
+              <a:srgbClr val="FF0000"/>
+            </a:solidFill>
+          </a:ln>
+        </p:spPr>
+        <p:style>
+          <a:lnRef idx="2">
+            <a:schemeClr val="accent1">
+              <a:shade val="50000"/>
+            </a:schemeClr>
+          </a:lnRef>
+          <a:fillRef idx="1">
+            <a:schemeClr val="accent1"/>
+          </a:fillRef>
+          <a:effectRef idx="0">
+            <a:schemeClr val="accent1"/>
+          </a:effectRef>
+          <a:fontRef idx="minor">
+            <a:schemeClr val="lt1"/>
+          </a:fontRef>
+        </p:style>
+        <p:txBody>
+          <a:bodyPr rtlCol="0" anchor="ctr"/>
+          <a:lstStyle/>
+          <a:p>
+            <a:pPr algn="ctr"/>
+            <a:endParaRPr lang="zh-CN" altLang="en-US"/>
+          </a:p>
+        </p:txBody>
+      </p:sp>
+      <p:sp>
+        <p:nvSpPr>
+          <p:cNvPr id="11" name="左弧形箭头 10"/>
+          <p:cNvSpPr/>
+          <p:nvPr/>
+        </p:nvSpPr>
+        <p:spPr>
+          <a:xfrm rot="1925411" flipH="1">
+            <a:off x="8677699" y="2399519"/>
+            <a:ext cx="791921" cy="2537303"/>
+          </a:xfrm>
+          <a:prstGeom prst="curvedRightArrow">
+            <a:avLst>
+              <a:gd name="adj1" fmla="val 25000"/>
+              <a:gd name="adj2" fmla="val 50000"/>
+              <a:gd name="adj3" fmla="val 47567"/>
+            </a:avLst>
+          </a:prstGeom>
+        </p:spPr>
+        <p:style>
+          <a:lnRef idx="0">
+            <a:schemeClr val="accent2"/>
+          </a:lnRef>
+          <a:fillRef idx="3">
+            <a:schemeClr val="accent2"/>
+          </a:fillRef>
+          <a:effectRef idx="3">
+            <a:schemeClr val="accent2"/>
+          </a:effectRef>
+          <a:fontRef idx="minor">
+            <a:schemeClr val="lt1"/>
+          </a:fontRef>
+        </p:style>
+        <p:txBody>
+          <a:bodyPr rtlCol="0" anchor="ctr"/>
+          <a:lstStyle/>
+          <a:p>
+            <a:pPr algn="ctr"/>
+            <a:endParaRPr lang="zh-CN" altLang="en-US">
+              <a:solidFill>
+                <a:schemeClr val="tx1"/>
+              </a:solidFill>
+            </a:endParaRPr>
+          </a:p>
+        </p:txBody>
+      </p:sp>
+    </p:spTree>
+    <p:extLst>
+      <p:ext uri="{BB962C8B-B14F-4D97-AF65-F5344CB8AC3E}">
+        <p14:creationId xmlns:p14="http://schemas.microsoft.com/office/powerpoint/2010/main" val="2540086800"/>
+      </p:ext>
+    </p:extLst>
+  </p:cSld>
+  <p:clrMapOvr>
+    <a:masterClrMapping/>
+  </p:clrMapOvr>
 </p:sld>
 </file>
 

</xml_diff>